<commit_message>
updated mypam host sim
built further functionality. not yet complete.
</commit_message>
<xml_diff>
--- a/MyPAM/Control Box.pptx
+++ b/MyPAM/Control Box.pptx
@@ -397,7 +397,7 @@
           <a:p>
             <a:fld id="{41E29FC0-815E-4FE4-A6A7-79C2CC018FF5}" type="datetimeFigureOut">
               <a:rPr lang="en-GB" smtClean="0"/>
-              <a:t>07/08/2019</a:t>
+              <a:t>09/08/2019</a:t>
             </a:fld>
             <a:endParaRPr lang="en-GB"/>
           </a:p>
@@ -597,7 +597,7 @@
           <a:p>
             <a:fld id="{41E29FC0-815E-4FE4-A6A7-79C2CC018FF5}" type="datetimeFigureOut">
               <a:rPr lang="en-GB" smtClean="0"/>
-              <a:t>07/08/2019</a:t>
+              <a:t>09/08/2019</a:t>
             </a:fld>
             <a:endParaRPr lang="en-GB"/>
           </a:p>
@@ -807,7 +807,7 @@
           <a:p>
             <a:fld id="{41E29FC0-815E-4FE4-A6A7-79C2CC018FF5}" type="datetimeFigureOut">
               <a:rPr lang="en-GB" smtClean="0"/>
-              <a:t>07/08/2019</a:t>
+              <a:t>09/08/2019</a:t>
             </a:fld>
             <a:endParaRPr lang="en-GB"/>
           </a:p>
@@ -1007,7 +1007,7 @@
           <a:p>
             <a:fld id="{41E29FC0-815E-4FE4-A6A7-79C2CC018FF5}" type="datetimeFigureOut">
               <a:rPr lang="en-GB" smtClean="0"/>
-              <a:t>07/08/2019</a:t>
+              <a:t>09/08/2019</a:t>
             </a:fld>
             <a:endParaRPr lang="en-GB"/>
           </a:p>
@@ -1283,7 +1283,7 @@
           <a:p>
             <a:fld id="{41E29FC0-815E-4FE4-A6A7-79C2CC018FF5}" type="datetimeFigureOut">
               <a:rPr lang="en-GB" smtClean="0"/>
-              <a:t>07/08/2019</a:t>
+              <a:t>09/08/2019</a:t>
             </a:fld>
             <a:endParaRPr lang="en-GB"/>
           </a:p>
@@ -1551,7 +1551,7 @@
           <a:p>
             <a:fld id="{41E29FC0-815E-4FE4-A6A7-79C2CC018FF5}" type="datetimeFigureOut">
               <a:rPr lang="en-GB" smtClean="0"/>
-              <a:t>07/08/2019</a:t>
+              <a:t>09/08/2019</a:t>
             </a:fld>
             <a:endParaRPr lang="en-GB"/>
           </a:p>
@@ -1966,7 +1966,7 @@
           <a:p>
             <a:fld id="{41E29FC0-815E-4FE4-A6A7-79C2CC018FF5}" type="datetimeFigureOut">
               <a:rPr lang="en-GB" smtClean="0"/>
-              <a:t>07/08/2019</a:t>
+              <a:t>09/08/2019</a:t>
             </a:fld>
             <a:endParaRPr lang="en-GB"/>
           </a:p>
@@ -2108,7 +2108,7 @@
           <a:p>
             <a:fld id="{41E29FC0-815E-4FE4-A6A7-79C2CC018FF5}" type="datetimeFigureOut">
               <a:rPr lang="en-GB" smtClean="0"/>
-              <a:t>07/08/2019</a:t>
+              <a:t>09/08/2019</a:t>
             </a:fld>
             <a:endParaRPr lang="en-GB"/>
           </a:p>
@@ -2221,7 +2221,7 @@
           <a:p>
             <a:fld id="{41E29FC0-815E-4FE4-A6A7-79C2CC018FF5}" type="datetimeFigureOut">
               <a:rPr lang="en-GB" smtClean="0"/>
-              <a:t>07/08/2019</a:t>
+              <a:t>09/08/2019</a:t>
             </a:fld>
             <a:endParaRPr lang="en-GB"/>
           </a:p>
@@ -2534,7 +2534,7 @@
           <a:p>
             <a:fld id="{41E29FC0-815E-4FE4-A6A7-79C2CC018FF5}" type="datetimeFigureOut">
               <a:rPr lang="en-GB" smtClean="0"/>
-              <a:t>07/08/2019</a:t>
+              <a:t>09/08/2019</a:t>
             </a:fld>
             <a:endParaRPr lang="en-GB"/>
           </a:p>
@@ -2823,7 +2823,7 @@
           <a:p>
             <a:fld id="{41E29FC0-815E-4FE4-A6A7-79C2CC018FF5}" type="datetimeFigureOut">
               <a:rPr lang="en-GB" smtClean="0"/>
-              <a:t>07/08/2019</a:t>
+              <a:t>09/08/2019</a:t>
             </a:fld>
             <a:endParaRPr lang="en-GB"/>
           </a:p>
@@ -3066,7 +3066,7 @@
           <a:p>
             <a:fld id="{41E29FC0-815E-4FE4-A6A7-79C2CC018FF5}" type="datetimeFigureOut">
               <a:rPr lang="en-GB" smtClean="0"/>
-              <a:t>07/08/2019</a:t>
+              <a:t>09/08/2019</a:t>
             </a:fld>
             <a:endParaRPr lang="en-GB"/>
           </a:p>
@@ -45995,7 +45995,7 @@
         <p:spPr>
           <a:xfrm>
             <a:off x="8328404" y="5222221"/>
-            <a:ext cx="2450607" cy="369332"/>
+            <a:ext cx="2132507" cy="369332"/>
           </a:xfrm>
           <a:prstGeom prst="rect">
             <a:avLst/>
@@ -46010,16 +46010,21 @@
           <a:p>
             <a:r>
               <a:rPr lang="en-GB" dirty="0"/>
-              <a:t>Sending Port: </a:t>
-            </a:r>
-            <a:r>
-              <a:rPr lang="en-GB" b="1" dirty="0"/>
-              <a:t>Unknown</a:t>
-            </a:r>
-            <a:r>
-              <a:rPr lang="en-GB" dirty="0"/>
+              <a:t>Sending Port</a:t>
+            </a:r>
+            <a:r>
+              <a:rPr lang="en-GB"/>
+              <a:t>: </a:t>
+            </a:r>
+            <a:r>
+              <a:rPr lang="en-GB" b="1"/>
+              <a:t>60500</a:t>
+            </a:r>
+            <a:r>
+              <a:rPr lang="en-GB"/>
               <a:t> </a:t>
             </a:r>
+            <a:endParaRPr lang="en-GB" dirty="0"/>
           </a:p>
         </p:txBody>
       </p:sp>

</xml_diff>

<commit_message>
started attractor trajectory, fixed mypam stuff
</commit_message>
<xml_diff>
--- a/MyPAM/Control Box.pptx
+++ b/MyPAM/Control Box.pptx
@@ -248,6 +248,32 @@
 </p:presentation>
 </file>
 
+<file path=ppt/commentAuthors.xml><?xml version="1.0" encoding="utf-8"?>
+<p:cmAuthorLst xmlns:a="http://schemas.openxmlformats.org/drawingml/2006/main" xmlns:r="http://schemas.openxmlformats.org/officeDocument/2006/relationships" xmlns:p="http://schemas.openxmlformats.org/presentationml/2006/main">
+  <p:cmAuthor id="1" name=" " initials="" lastIdx="1" clrIdx="0">
+    <p:extLst>
+      <p:ext uri="{19B8F6BF-5375-455C-9EA6-DF929625EA0E}">
+        <p15:presenceInfo xmlns:p15="http://schemas.microsoft.com/office/powerpoint/2012/main" userId="9e1c6c8f08769282" providerId="Windows Live"/>
+      </p:ext>
+    </p:extLst>
+  </p:cmAuthor>
+</p:cmAuthorLst>
+</file>
+
+<file path=ppt/comments/comment1.xml><?xml version="1.0" encoding="utf-8"?>
+<p:cmLst xmlns:a="http://schemas.openxmlformats.org/drawingml/2006/main" xmlns:r="http://schemas.openxmlformats.org/officeDocument/2006/relationships" xmlns:p="http://schemas.openxmlformats.org/presentationml/2006/main">
+  <p:cm authorId="1" dt="2019-08-23T10:41:34.600" idx="1">
+    <p:pos x="10" y="10"/>
+    <p:text>pythagoras here is incorrect</p:text>
+    <p:extLst>
+      <p:ext uri="{C676402C-5697-4E1C-873F-D02D1690AC5C}">
+        <p15:threadingInfo xmlns:p15="http://schemas.microsoft.com/office/powerpoint/2012/main" timeZoneBias="-60"/>
+      </p:ext>
+    </p:extLst>
+  </p:cm>
+</p:cmLst>
+</file>
+
 <file path=ppt/slideLayouts/slideLayout1.xml><?xml version="1.0" encoding="utf-8"?>
 <p:sldLayout xmlns:a="http://schemas.openxmlformats.org/drawingml/2006/main" xmlns:r="http://schemas.openxmlformats.org/officeDocument/2006/relationships" xmlns:p="http://schemas.openxmlformats.org/presentationml/2006/main" type="title" preserve="1">
   <p:cSld name="Title Slide">
@@ -397,7 +423,7 @@
           <a:p>
             <a:fld id="{41E29FC0-815E-4FE4-A6A7-79C2CC018FF5}" type="datetimeFigureOut">
               <a:rPr lang="en-GB" smtClean="0"/>
-              <a:t>09/08/2019</a:t>
+              <a:t>23/08/2019</a:t>
             </a:fld>
             <a:endParaRPr lang="en-GB"/>
           </a:p>
@@ -597,7 +623,7 @@
           <a:p>
             <a:fld id="{41E29FC0-815E-4FE4-A6A7-79C2CC018FF5}" type="datetimeFigureOut">
               <a:rPr lang="en-GB" smtClean="0"/>
-              <a:t>09/08/2019</a:t>
+              <a:t>23/08/2019</a:t>
             </a:fld>
             <a:endParaRPr lang="en-GB"/>
           </a:p>
@@ -807,7 +833,7 @@
           <a:p>
             <a:fld id="{41E29FC0-815E-4FE4-A6A7-79C2CC018FF5}" type="datetimeFigureOut">
               <a:rPr lang="en-GB" smtClean="0"/>
-              <a:t>09/08/2019</a:t>
+              <a:t>23/08/2019</a:t>
             </a:fld>
             <a:endParaRPr lang="en-GB"/>
           </a:p>
@@ -1007,7 +1033,7 @@
           <a:p>
             <a:fld id="{41E29FC0-815E-4FE4-A6A7-79C2CC018FF5}" type="datetimeFigureOut">
               <a:rPr lang="en-GB" smtClean="0"/>
-              <a:t>09/08/2019</a:t>
+              <a:t>23/08/2019</a:t>
             </a:fld>
             <a:endParaRPr lang="en-GB"/>
           </a:p>
@@ -1283,7 +1309,7 @@
           <a:p>
             <a:fld id="{41E29FC0-815E-4FE4-A6A7-79C2CC018FF5}" type="datetimeFigureOut">
               <a:rPr lang="en-GB" smtClean="0"/>
-              <a:t>09/08/2019</a:t>
+              <a:t>23/08/2019</a:t>
             </a:fld>
             <a:endParaRPr lang="en-GB"/>
           </a:p>
@@ -1551,7 +1577,7 @@
           <a:p>
             <a:fld id="{41E29FC0-815E-4FE4-A6A7-79C2CC018FF5}" type="datetimeFigureOut">
               <a:rPr lang="en-GB" smtClean="0"/>
-              <a:t>09/08/2019</a:t>
+              <a:t>23/08/2019</a:t>
             </a:fld>
             <a:endParaRPr lang="en-GB"/>
           </a:p>
@@ -1966,7 +1992,7 @@
           <a:p>
             <a:fld id="{41E29FC0-815E-4FE4-A6A7-79C2CC018FF5}" type="datetimeFigureOut">
               <a:rPr lang="en-GB" smtClean="0"/>
-              <a:t>09/08/2019</a:t>
+              <a:t>23/08/2019</a:t>
             </a:fld>
             <a:endParaRPr lang="en-GB"/>
           </a:p>
@@ -2108,7 +2134,7 @@
           <a:p>
             <a:fld id="{41E29FC0-815E-4FE4-A6A7-79C2CC018FF5}" type="datetimeFigureOut">
               <a:rPr lang="en-GB" smtClean="0"/>
-              <a:t>09/08/2019</a:t>
+              <a:t>23/08/2019</a:t>
             </a:fld>
             <a:endParaRPr lang="en-GB"/>
           </a:p>
@@ -2221,7 +2247,7 @@
           <a:p>
             <a:fld id="{41E29FC0-815E-4FE4-A6A7-79C2CC018FF5}" type="datetimeFigureOut">
               <a:rPr lang="en-GB" smtClean="0"/>
-              <a:t>09/08/2019</a:t>
+              <a:t>23/08/2019</a:t>
             </a:fld>
             <a:endParaRPr lang="en-GB"/>
           </a:p>
@@ -2534,7 +2560,7 @@
           <a:p>
             <a:fld id="{41E29FC0-815E-4FE4-A6A7-79C2CC018FF5}" type="datetimeFigureOut">
               <a:rPr lang="en-GB" smtClean="0"/>
-              <a:t>09/08/2019</a:t>
+              <a:t>23/08/2019</a:t>
             </a:fld>
             <a:endParaRPr lang="en-GB"/>
           </a:p>
@@ -2823,7 +2849,7 @@
           <a:p>
             <a:fld id="{41E29FC0-815E-4FE4-A6A7-79C2CC018FF5}" type="datetimeFigureOut">
               <a:rPr lang="en-GB" smtClean="0"/>
-              <a:t>09/08/2019</a:t>
+              <a:t>23/08/2019</a:t>
             </a:fld>
             <a:endParaRPr lang="en-GB"/>
           </a:p>
@@ -3066,7 +3092,7 @@
           <a:p>
             <a:fld id="{41E29FC0-815E-4FE4-A6A7-79C2CC018FF5}" type="datetimeFigureOut">
               <a:rPr lang="en-GB" smtClean="0"/>
-              <a:t>09/08/2019</a:t>
+              <a:t>23/08/2019</a:t>
             </a:fld>
             <a:endParaRPr lang="en-GB"/>
           </a:p>

</xml_diff>